<commit_message>
open gallery viewer after image save; change save path folder
</commit_message>
<xml_diff>
--- a/doc/meilensteine/MS4.pptx
+++ b/doc/meilensteine/MS4.pptx
@@ -211,7 +211,7 @@
           <a:p>
             <a:fld id="{6A40C5B6-A996-4856-B7EE-1D4FA1E26334}" type="datetimeFigureOut">
               <a:rPr lang="de-DE" smtClean="0"/>
-              <a:t>26.06.2023</a:t>
+              <a:t>27.06.2023</a:t>
             </a:fld>
             <a:endParaRPr lang="de-DE"/>
           </a:p>
@@ -623,11 +623,10 @@
           <a:bodyPr/>
           <a:lstStyle/>
           <a:p>
-            <a:fld id="{BEDEE69A-11A3-4434-99A2-BDA696E792E7}" type="datetime1">
-              <a:rPr lang="de-DE" smtClean="0"/>
-              <a:t>26.06.2023</a:t>
-            </a:fld>
-            <a:endParaRPr lang="de-DE"/>
+            <a:r>
+              <a:rPr lang="de-DE"/>
+              <a:t>29.06.2023</a:t>
+            </a:r>
           </a:p>
         </p:txBody>
       </p:sp>
@@ -824,11 +823,10 @@
           <a:bodyPr/>
           <a:lstStyle/>
           <a:p>
-            <a:fld id="{A78DDD15-24DB-4F38-9693-B0195021E653}" type="datetime1">
-              <a:rPr lang="de-DE" smtClean="0"/>
-              <a:t>26.06.2023</a:t>
-            </a:fld>
-            <a:endParaRPr lang="de-DE"/>
+            <a:r>
+              <a:rPr lang="de-DE"/>
+              <a:t>29.06.2023</a:t>
+            </a:r>
           </a:p>
         </p:txBody>
       </p:sp>
@@ -1035,11 +1033,10 @@
           <a:bodyPr/>
           <a:lstStyle/>
           <a:p>
-            <a:fld id="{235EB7BB-E15D-4803-9F82-F38BAB114C41}" type="datetime1">
-              <a:rPr lang="de-DE" smtClean="0"/>
-              <a:t>26.06.2023</a:t>
-            </a:fld>
-            <a:endParaRPr lang="de-DE"/>
+            <a:r>
+              <a:rPr lang="de-DE"/>
+              <a:t>29.06.2023</a:t>
+            </a:r>
           </a:p>
         </p:txBody>
       </p:sp>
@@ -1236,11 +1233,10 @@
           <a:bodyPr/>
           <a:lstStyle/>
           <a:p>
-            <a:fld id="{25118A72-986D-48C9-AAC8-AE8DB10EA9EB}" type="datetime1">
-              <a:rPr lang="de-DE" smtClean="0"/>
-              <a:t>26.06.2023</a:t>
-            </a:fld>
-            <a:endParaRPr lang="de-DE"/>
+            <a:r>
+              <a:rPr lang="de-DE"/>
+              <a:t>29.06.2023</a:t>
+            </a:r>
           </a:p>
         </p:txBody>
       </p:sp>
@@ -1514,11 +1510,10 @@
           <a:bodyPr/>
           <a:lstStyle/>
           <a:p>
-            <a:fld id="{EB361721-384D-41CB-BAE2-6AA7EF6E00CC}" type="datetime1">
-              <a:rPr lang="de-DE" smtClean="0"/>
-              <a:t>26.06.2023</a:t>
-            </a:fld>
-            <a:endParaRPr lang="de-DE"/>
+            <a:r>
+              <a:rPr lang="de-DE"/>
+              <a:t>29.06.2023</a:t>
+            </a:r>
           </a:p>
         </p:txBody>
       </p:sp>
@@ -1782,11 +1777,10 @@
           <a:bodyPr/>
           <a:lstStyle/>
           <a:p>
-            <a:fld id="{DA98ED4E-A997-4FA2-B1F3-7252FBE188D3}" type="datetime1">
-              <a:rPr lang="de-DE" smtClean="0"/>
-              <a:t>26.06.2023</a:t>
-            </a:fld>
-            <a:endParaRPr lang="de-DE"/>
+            <a:r>
+              <a:rPr lang="de-DE"/>
+              <a:t>29.06.2023</a:t>
+            </a:r>
           </a:p>
         </p:txBody>
       </p:sp>
@@ -2197,11 +2191,10 @@
           <a:bodyPr/>
           <a:lstStyle/>
           <a:p>
-            <a:fld id="{47504D58-6ED8-4386-B94F-58E41518CDFC}" type="datetime1">
-              <a:rPr lang="de-DE" smtClean="0"/>
-              <a:t>26.06.2023</a:t>
-            </a:fld>
-            <a:endParaRPr lang="de-DE"/>
+            <a:r>
+              <a:rPr lang="de-DE"/>
+              <a:t>29.06.2023</a:t>
+            </a:r>
           </a:p>
         </p:txBody>
       </p:sp>
@@ -2341,11 +2334,10 @@
           <a:bodyPr/>
           <a:lstStyle/>
           <a:p>
-            <a:fld id="{D64C9777-BEC4-456E-8333-1B28A7A8F10A}" type="datetime1">
-              <a:rPr lang="de-DE" smtClean="0"/>
-              <a:t>26.06.2023</a:t>
-            </a:fld>
-            <a:endParaRPr lang="de-DE"/>
+            <a:r>
+              <a:rPr lang="de-DE"/>
+              <a:t>29.06.2023</a:t>
+            </a:r>
           </a:p>
         </p:txBody>
       </p:sp>
@@ -2457,11 +2449,10 @@
           <a:bodyPr/>
           <a:lstStyle/>
           <a:p>
-            <a:fld id="{4D070D1B-4CF7-4CF1-8650-05B5DDF4A98D}" type="datetime1">
-              <a:rPr lang="de-DE" smtClean="0"/>
-              <a:t>26.06.2023</a:t>
-            </a:fld>
-            <a:endParaRPr lang="de-DE"/>
+            <a:r>
+              <a:rPr lang="de-DE"/>
+              <a:t>29.06.2023</a:t>
+            </a:r>
           </a:p>
         </p:txBody>
       </p:sp>
@@ -2771,11 +2762,10 @@
           <a:bodyPr/>
           <a:lstStyle/>
           <a:p>
-            <a:fld id="{9606A8FD-1120-47F5-8B84-5DC54FF80FE5}" type="datetime1">
-              <a:rPr lang="de-DE" smtClean="0"/>
-              <a:t>26.06.2023</a:t>
-            </a:fld>
-            <a:endParaRPr lang="de-DE"/>
+            <a:r>
+              <a:rPr lang="de-DE"/>
+              <a:t>29.06.2023</a:t>
+            </a:r>
           </a:p>
         </p:txBody>
       </p:sp>
@@ -3062,11 +3052,10 @@
           <a:bodyPr/>
           <a:lstStyle/>
           <a:p>
-            <a:fld id="{D2807168-009F-4A1A-BCE2-D41650D4907C}" type="datetime1">
-              <a:rPr lang="de-DE" smtClean="0"/>
-              <a:t>26.06.2023</a:t>
-            </a:fld>
-            <a:endParaRPr lang="de-DE"/>
+            <a:r>
+              <a:rPr lang="de-DE"/>
+              <a:t>29.06.2023</a:t>
+            </a:r>
           </a:p>
         </p:txBody>
       </p:sp>
@@ -3306,11 +3295,10 @@
             </a:lvl1pPr>
           </a:lstStyle>
           <a:p>
-            <a:fld id="{83D790D9-4C3D-4C09-BCD3-FAE5B9A27C86}" type="datetime1">
-              <a:rPr lang="de-DE" smtClean="0"/>
-              <a:t>26.06.2023</a:t>
-            </a:fld>
-            <a:endParaRPr lang="de-DE"/>
+            <a:r>
+              <a:rPr lang="de-DE"/>
+              <a:t>29.06.2023</a:t>
+            </a:r>
           </a:p>
         </p:txBody>
       </p:sp>
@@ -3821,11 +3809,10 @@
           <a:bodyPr/>
           <a:lstStyle/>
           <a:p>
-            <a:fld id="{6915477C-4CE1-47B0-868E-938A33615E2D}" type="datetime1">
-              <a:rPr lang="de-DE" smtClean="0"/>
-              <a:t>26.06.2023</a:t>
-            </a:fld>
-            <a:endParaRPr lang="de-DE"/>
+            <a:r>
+              <a:rPr lang="de-DE"/>
+              <a:t>29.06.2023</a:t>
+            </a:r>
           </a:p>
         </p:txBody>
       </p:sp>
@@ -3937,11 +3924,10 @@
           <a:bodyPr/>
           <a:lstStyle/>
           <a:p>
-            <a:fld id="{25118A72-986D-48C9-AAC8-AE8DB10EA9EB}" type="datetime1">
-              <a:rPr lang="de-DE" smtClean="0"/>
-              <a:t>26.06.2023</a:t>
-            </a:fld>
-            <a:endParaRPr lang="de-DE"/>
+            <a:r>
+              <a:rPr lang="de-DE"/>
+              <a:t>29.06.2023</a:t>
+            </a:r>
           </a:p>
         </p:txBody>
       </p:sp>
@@ -4051,7 +4037,7 @@
         </p:nvSpPr>
         <p:spPr>
           <a:xfrm>
-            <a:off x="906571" y="869198"/>
+            <a:off x="530423" y="732537"/>
             <a:ext cx="615553" cy="1560351"/>
           </a:xfrm>
           <a:prstGeom prst="rect">
@@ -4121,7 +4107,7 @@
         </p:nvSpPr>
         <p:spPr>
           <a:xfrm>
-            <a:off x="906571" y="3956605"/>
+            <a:off x="530422" y="3956605"/>
             <a:ext cx="615553" cy="1560351"/>
           </a:xfrm>
           <a:prstGeom prst="rect">
@@ -4138,6 +4124,76 @@
             <a:r>
               <a:rPr lang="de-DE" sz="2800" dirty="0"/>
               <a:t>Student</a:t>
+            </a:r>
+          </a:p>
+        </p:txBody>
+      </p:sp>
+      <p:sp>
+        <p:nvSpPr>
+          <p:cNvPr id="2" name="Textfeld 1">
+            <a:extLst>
+              <a:ext uri="{FF2B5EF4-FFF2-40B4-BE49-F238E27FC236}">
+                <a16:creationId xmlns:a16="http://schemas.microsoft.com/office/drawing/2014/main" id="{06A6E97B-27ED-16EF-A833-26C8682BCD0C}"/>
+              </a:ext>
+            </a:extLst>
+          </p:cNvPr>
+          <p:cNvSpPr txBox="1"/>
+          <p:nvPr/>
+        </p:nvSpPr>
+        <p:spPr>
+          <a:xfrm>
+            <a:off x="1522124" y="453005"/>
+            <a:ext cx="400110" cy="2119416"/>
+          </a:xfrm>
+          <a:prstGeom prst="rect">
+            <a:avLst/>
+          </a:prstGeom>
+          <a:noFill/>
+        </p:spPr>
+        <p:txBody>
+          <a:bodyPr vert="vert270" wrap="square" rtlCol="0">
+            <a:spAutoFit/>
+          </a:bodyPr>
+          <a:lstStyle/>
+          <a:p>
+            <a:r>
+              <a:rPr lang="de-DE" sz="1400" dirty="0"/>
+              <a:t>Genauigkeit auf 100 Bilder</a:t>
+            </a:r>
+          </a:p>
+        </p:txBody>
+      </p:sp>
+      <p:sp>
+        <p:nvSpPr>
+          <p:cNvPr id="3" name="Textfeld 2">
+            <a:extLst>
+              <a:ext uri="{FF2B5EF4-FFF2-40B4-BE49-F238E27FC236}">
+                <a16:creationId xmlns:a16="http://schemas.microsoft.com/office/drawing/2014/main" id="{BAAE4175-583F-F6E2-499A-864F3E730202}"/>
+              </a:ext>
+            </a:extLst>
+          </p:cNvPr>
+          <p:cNvSpPr txBox="1"/>
+          <p:nvPr/>
+        </p:nvSpPr>
+        <p:spPr>
+          <a:xfrm>
+            <a:off x="1522124" y="3677073"/>
+            <a:ext cx="400110" cy="2119416"/>
+          </a:xfrm>
+          <a:prstGeom prst="rect">
+            <a:avLst/>
+          </a:prstGeom>
+          <a:noFill/>
+        </p:spPr>
+        <p:txBody>
+          <a:bodyPr vert="vert270" wrap="square" rtlCol="0">
+            <a:spAutoFit/>
+          </a:bodyPr>
+          <a:lstStyle/>
+          <a:p>
+            <a:r>
+              <a:rPr lang="de-DE" sz="1400" dirty="0"/>
+              <a:t>Genauigkeit auf 100 Bilder</a:t>
             </a:r>
           </a:p>
         </p:txBody>
@@ -4295,11 +4351,10 @@
           <a:bodyPr/>
           <a:lstStyle/>
           <a:p>
-            <a:fld id="{6085DC2A-F81F-4B85-85AA-69758A726F08}" type="datetime1">
-              <a:rPr lang="de-DE" smtClean="0"/>
-              <a:t>26.06.2023</a:t>
-            </a:fld>
-            <a:endParaRPr lang="de-DE"/>
+            <a:r>
+              <a:rPr lang="de-DE"/>
+              <a:t>29.06.2023</a:t>
+            </a:r>
           </a:p>
         </p:txBody>
       </p:sp>
@@ -4360,12 +4415,150 @@
           </a:p>
         </p:txBody>
       </p:sp>
+      <p:sp>
+        <p:nvSpPr>
+          <p:cNvPr id="10" name="Textfeld 9">
+            <a:extLst>
+              <a:ext uri="{FF2B5EF4-FFF2-40B4-BE49-F238E27FC236}">
+                <a16:creationId xmlns:a16="http://schemas.microsoft.com/office/drawing/2014/main" id="{94E007A3-6029-5841-9DA5-920184B56AC3}"/>
+              </a:ext>
+            </a:extLst>
+          </p:cNvPr>
+          <p:cNvSpPr txBox="1"/>
+          <p:nvPr/>
+        </p:nvSpPr>
+        <p:spPr>
+          <a:xfrm>
+            <a:off x="6460222" y="4824475"/>
+            <a:ext cx="1215705" cy="923330"/>
+          </a:xfrm>
+          <a:prstGeom prst="rect">
+            <a:avLst/>
+          </a:prstGeom>
+          <a:noFill/>
+        </p:spPr>
+        <p:txBody>
+          <a:bodyPr wrap="square" rtlCol="0">
+            <a:spAutoFit/>
+          </a:bodyPr>
+          <a:lstStyle/>
+          <a:p>
+            <a:r>
+              <a:rPr lang="de-DE" dirty="0"/>
+              <a:t>4: 99.85%</a:t>
+            </a:r>
+            <a:br>
+              <a:rPr lang="de-DE" dirty="0"/>
+            </a:br>
+            <a:r>
+              <a:rPr lang="de-DE" dirty="0"/>
+              <a:t>Y: 0.04%</a:t>
+            </a:r>
+            <a:br>
+              <a:rPr lang="de-DE" dirty="0"/>
+            </a:br>
+            <a:r>
+              <a:rPr lang="de-DE" dirty="0"/>
+              <a:t>q: 0.04%</a:t>
+            </a:r>
+          </a:p>
+        </p:txBody>
+      </p:sp>
+      <p:sp>
+        <p:nvSpPr>
+          <p:cNvPr id="7" name="Rechteck 6">
+            <a:extLst>
+              <a:ext uri="{FF2B5EF4-FFF2-40B4-BE49-F238E27FC236}">
+                <a16:creationId xmlns:a16="http://schemas.microsoft.com/office/drawing/2014/main" id="{B24C9B1F-09E5-E39C-B7AC-1F39BFF34FC1}"/>
+              </a:ext>
+            </a:extLst>
+          </p:cNvPr>
+          <p:cNvSpPr/>
+          <p:nvPr/>
+        </p:nvSpPr>
+        <p:spPr>
+          <a:xfrm>
+            <a:off x="6460223" y="4824476"/>
+            <a:ext cx="1073092" cy="923330"/>
+          </a:xfrm>
+          <a:prstGeom prst="rect">
+            <a:avLst/>
+          </a:prstGeom>
+          <a:noFill/>
+        </p:spPr>
+        <p:style>
+          <a:lnRef idx="2">
+            <a:schemeClr val="accent1">
+              <a:shade val="15000"/>
+            </a:schemeClr>
+          </a:lnRef>
+          <a:fillRef idx="1">
+            <a:schemeClr val="accent1"/>
+          </a:fillRef>
+          <a:effectRef idx="0">
+            <a:schemeClr val="accent1"/>
+          </a:effectRef>
+          <a:fontRef idx="minor">
+            <a:schemeClr val="lt1"/>
+          </a:fontRef>
+        </p:style>
+        <p:txBody>
+          <a:bodyPr rtlCol="0" anchor="ctr"/>
+          <a:lstStyle/>
+          <a:p>
+            <a:pPr algn="ctr"/>
+            <a:endParaRPr lang="de-DE"/>
+          </a:p>
+        </p:txBody>
+      </p:sp>
+      <p:cxnSp>
+        <p:nvCxnSpPr>
+          <p:cNvPr id="11" name="Gerade Verbindung mit Pfeil 10">
+            <a:extLst>
+              <a:ext uri="{FF2B5EF4-FFF2-40B4-BE49-F238E27FC236}">
+                <a16:creationId xmlns:a16="http://schemas.microsoft.com/office/drawing/2014/main" id="{7916F31B-8B48-F7DD-BB77-A87235CC375A}"/>
+              </a:ext>
+            </a:extLst>
+          </p:cNvPr>
+          <p:cNvCxnSpPr/>
+          <p:nvPr/>
+        </p:nvCxnSpPr>
+        <p:spPr>
+          <a:xfrm flipH="1">
+            <a:off x="7533315" y="5209563"/>
+            <a:ext cx="829810" cy="0"/>
+          </a:xfrm>
+          <a:prstGeom prst="straightConnector1">
+            <a:avLst/>
+          </a:prstGeom>
+          <a:ln w="28575">
+            <a:solidFill>
+              <a:schemeClr val="tx1"/>
+            </a:solidFill>
+            <a:tailEnd type="triangle"/>
+          </a:ln>
+        </p:spPr>
+        <p:style>
+          <a:lnRef idx="1">
+            <a:schemeClr val="accent1"/>
+          </a:lnRef>
+          <a:fillRef idx="0">
+            <a:schemeClr val="accent1"/>
+          </a:fillRef>
+          <a:effectRef idx="0">
+            <a:schemeClr val="accent1"/>
+          </a:effectRef>
+          <a:fontRef idx="minor">
+            <a:schemeClr val="tx1"/>
+          </a:fontRef>
+        </p:style>
+      </p:cxnSp>
       <p:pic>
         <p:nvPicPr>
-          <p:cNvPr id="8" name="Grafik 7" descr="Ein Bild, das Screenshot, Text, Design enthält.&#10;&#10;Automatisch generierte Beschreibung">
-            <a:extLst>
-              <a:ext uri="{FF2B5EF4-FFF2-40B4-BE49-F238E27FC236}">
-                <a16:creationId xmlns:a16="http://schemas.microsoft.com/office/drawing/2014/main" id="{45728304-E4C7-E0E1-D0DC-3539BFFBCEDE}"/>
+          <p:cNvPr id="13" name="Grafik 12" descr="Ein Bild, das Text, Screenshot, Schrift, Design enthält.&#10;&#10;Automatisch generierte Beschreibung">
+            <a:extLst>
+              <a:ext uri="{FF2B5EF4-FFF2-40B4-BE49-F238E27FC236}">
+                <a16:creationId xmlns:a16="http://schemas.microsoft.com/office/drawing/2014/main" id="{31884921-DBB8-8E15-C5F7-642B65E3ABD2}"/>
               </a:ext>
             </a:extLst>
           </p:cNvPr>
@@ -4388,63 +4581,14 @@
         </p:blipFill>
         <p:spPr>
           <a:xfrm>
-            <a:off x="8363125" y="595745"/>
-            <a:ext cx="2719814" cy="5666509"/>
+            <a:off x="8363125" y="365125"/>
+            <a:ext cx="2913210" cy="6069435"/>
           </a:xfrm>
           <a:prstGeom prst="rect">
             <a:avLst/>
           </a:prstGeom>
         </p:spPr>
       </p:pic>
-      <p:sp>
-        <p:nvSpPr>
-          <p:cNvPr id="10" name="Textfeld 9">
-            <a:extLst>
-              <a:ext uri="{FF2B5EF4-FFF2-40B4-BE49-F238E27FC236}">
-                <a16:creationId xmlns:a16="http://schemas.microsoft.com/office/drawing/2014/main" id="{94E007A3-6029-5841-9DA5-920184B56AC3}"/>
-              </a:ext>
-            </a:extLst>
-          </p:cNvPr>
-          <p:cNvSpPr txBox="1"/>
-          <p:nvPr/>
-        </p:nvSpPr>
-        <p:spPr>
-          <a:xfrm>
-            <a:off x="7239699" y="4765752"/>
-            <a:ext cx="1215705" cy="923330"/>
-          </a:xfrm>
-          <a:prstGeom prst="rect">
-            <a:avLst/>
-          </a:prstGeom>
-          <a:noFill/>
-        </p:spPr>
-        <p:txBody>
-          <a:bodyPr wrap="square" rtlCol="0">
-            <a:spAutoFit/>
-          </a:bodyPr>
-          <a:lstStyle/>
-          <a:p>
-            <a:r>
-              <a:rPr lang="de-DE" dirty="0"/>
-              <a:t>4: 98.75%</a:t>
-            </a:r>
-            <a:br>
-              <a:rPr lang="de-DE" dirty="0"/>
-            </a:br>
-            <a:r>
-              <a:rPr lang="de-DE" dirty="0"/>
-              <a:t>9: 0.77%</a:t>
-            </a:r>
-            <a:br>
-              <a:rPr lang="de-DE" dirty="0"/>
-            </a:br>
-            <a:r>
-              <a:rPr lang="de-DE" dirty="0"/>
-              <a:t>q: 0.39%</a:t>
-            </a:r>
-          </a:p>
-        </p:txBody>
-      </p:sp>
     </p:spTree>
     <p:extLst>
       <p:ext uri="{BB962C8B-B14F-4D97-AF65-F5344CB8AC3E}">
@@ -4524,11 +4668,10 @@
           <a:bodyPr/>
           <a:lstStyle/>
           <a:p>
-            <a:fld id="{B79CD2A6-70F0-4B6C-A4AD-0BE6D21F5EE2}" type="datetime1">
-              <a:rPr lang="de-DE" smtClean="0"/>
-              <a:t>26.06.2023</a:t>
-            </a:fld>
-            <a:endParaRPr lang="de-DE"/>
+            <a:r>
+              <a:rPr lang="de-DE"/>
+              <a:t>29.06.2023</a:t>
+            </a:r>
           </a:p>
         </p:txBody>
       </p:sp>
@@ -5093,11 +5236,10 @@
           <a:bodyPr/>
           <a:lstStyle/>
           <a:p>
-            <a:fld id="{25118A72-986D-48C9-AAC8-AE8DB10EA9EB}" type="datetime1">
-              <a:rPr lang="de-DE" smtClean="0"/>
-              <a:t>26.06.2023</a:t>
-            </a:fld>
-            <a:endParaRPr lang="de-DE"/>
+            <a:r>
+              <a:rPr lang="de-DE"/>
+              <a:t>29.06.2023</a:t>
+            </a:r>
           </a:p>
         </p:txBody>
       </p:sp>
@@ -5540,8 +5682,8 @@
         </p:nvCxnSpPr>
         <p:spPr>
           <a:xfrm>
-            <a:off x="9211746" y="5071950"/>
-            <a:ext cx="110487" cy="522856"/>
+            <a:off x="9202723" y="5050172"/>
+            <a:ext cx="119510" cy="544634"/>
           </a:xfrm>
           <a:prstGeom prst="straightConnector1">
             <a:avLst/>
@@ -5630,15 +5772,7 @@
           <a:p>
             <a:r>
               <a:rPr lang="de-DE" sz="2000" b="1" dirty="0"/>
-              <a:t>    H  a   l </a:t>
-            </a:r>
-            <a:r>
-              <a:rPr lang="de-DE" sz="2000" b="1" dirty="0" err="1"/>
-              <a:t>l</a:t>
-            </a:r>
-            <a:r>
-              <a:rPr lang="de-DE" sz="2000" b="1" dirty="0"/>
-              <a:t>   O       W    e  l  t    Z   G     0    G     Z   0    2   3</a:t>
+              <a:t>    H  a   l l   O       W    e  l  t    Z   G     0    G     Z   0    2   3</a:t>
             </a:r>
           </a:p>
         </p:txBody>
@@ -5779,11 +5913,10 @@
           <a:bodyPr/>
           <a:lstStyle/>
           <a:p>
-            <a:fld id="{065DC3C3-A251-411D-9204-A665BD7B6442}" type="datetime1">
-              <a:rPr lang="de-DE" smtClean="0"/>
-              <a:t>26.06.2023</a:t>
-            </a:fld>
-            <a:endParaRPr lang="de-DE"/>
+            <a:r>
+              <a:rPr lang="de-DE"/>
+              <a:t>29.06.2023</a:t>
+            </a:r>
           </a:p>
         </p:txBody>
       </p:sp>
@@ -5928,11 +6061,10 @@
           <a:bodyPr/>
           <a:lstStyle/>
           <a:p>
-            <a:fld id="{3C622B7E-6CE7-414F-8907-A5BB078E8D6D}" type="datetime1">
-              <a:rPr lang="de-DE" smtClean="0"/>
-              <a:t>26.06.2023</a:t>
-            </a:fld>
-            <a:endParaRPr lang="de-DE"/>
+            <a:r>
+              <a:rPr lang="de-DE"/>
+              <a:t>29.06.2023</a:t>
+            </a:r>
           </a:p>
         </p:txBody>
       </p:sp>
@@ -6163,11 +6295,10 @@
           <a:bodyPr/>
           <a:lstStyle/>
           <a:p>
-            <a:fld id="{B05BEB5C-4BC9-43C8-BD10-326274D1CAA2}" type="datetime1">
-              <a:rPr lang="de-DE" smtClean="0"/>
-              <a:t>26.06.2023</a:t>
-            </a:fld>
-            <a:endParaRPr lang="de-DE"/>
+            <a:r>
+              <a:rPr lang="de-DE"/>
+              <a:t>29.06.2023</a:t>
+            </a:r>
           </a:p>
         </p:txBody>
       </p:sp>
@@ -6483,11 +6614,10 @@
           <a:bodyPr/>
           <a:lstStyle/>
           <a:p>
-            <a:fld id="{F086D00E-2AE6-42D7-9990-78C326B7BBE6}" type="datetime1">
-              <a:rPr lang="de-DE" smtClean="0"/>
-              <a:t>26.06.2023</a:t>
-            </a:fld>
-            <a:endParaRPr lang="de-DE"/>
+            <a:r>
+              <a:rPr lang="de-DE"/>
+              <a:t>29.06.2023</a:t>
+            </a:r>
           </a:p>
         </p:txBody>
       </p:sp>
@@ -6778,11 +6908,10 @@
           <a:bodyPr/>
           <a:lstStyle/>
           <a:p>
-            <a:fld id="{FD08A40C-BC3C-48C5-B9BF-B969D5F8E7C5}" type="datetime1">
-              <a:rPr lang="de-DE" smtClean="0"/>
-              <a:t>26.06.2023</a:t>
-            </a:fld>
-            <a:endParaRPr lang="de-DE"/>
+            <a:r>
+              <a:rPr lang="de-DE"/>
+              <a:t>29.06.2023</a:t>
+            </a:r>
           </a:p>
         </p:txBody>
       </p:sp>
@@ -8580,11 +8709,10 @@
           <a:bodyPr/>
           <a:lstStyle/>
           <a:p>
-            <a:fld id="{8C3FA6DE-6ED4-49FB-A765-F7984FCDBBCC}" type="datetime1">
-              <a:rPr lang="de-DE" smtClean="0"/>
-              <a:t>26.06.2023</a:t>
-            </a:fld>
-            <a:endParaRPr lang="de-DE"/>
+            <a:r>
+              <a:rPr lang="de-DE"/>
+              <a:t>29.06.2023</a:t>
+            </a:r>
           </a:p>
         </p:txBody>
       </p:sp>
@@ -8817,11 +8945,10 @@
           <a:bodyPr/>
           <a:lstStyle/>
           <a:p>
-            <a:fld id="{AEFEC425-9E01-464A-8616-98A84DF87E39}" type="datetime1">
-              <a:rPr lang="de-DE" smtClean="0"/>
-              <a:t>26.06.2023</a:t>
-            </a:fld>
-            <a:endParaRPr lang="de-DE"/>
+            <a:r>
+              <a:rPr lang="de-DE"/>
+              <a:t>29.06.2023</a:t>
+            </a:r>
           </a:p>
         </p:txBody>
       </p:sp>
@@ -9522,11 +9649,10 @@
           <a:bodyPr/>
           <a:lstStyle/>
           <a:p>
-            <a:fld id="{25118A72-986D-48C9-AAC8-AE8DB10EA9EB}" type="datetime1">
-              <a:rPr lang="de-DE" smtClean="0"/>
-              <a:t>26.06.2023</a:t>
-            </a:fld>
-            <a:endParaRPr lang="de-DE"/>
+            <a:r>
+              <a:rPr lang="de-DE"/>
+              <a:t>29.06.2023</a:t>
+            </a:r>
           </a:p>
         </p:txBody>
       </p:sp>
@@ -11320,11 +11446,10 @@
           <a:bodyPr/>
           <a:lstStyle/>
           <a:p>
-            <a:fld id="{25118A72-986D-48C9-AAC8-AE8DB10EA9EB}" type="datetime1">
-              <a:rPr lang="de-DE" smtClean="0"/>
-              <a:t>26.06.2023</a:t>
-            </a:fld>
-            <a:endParaRPr lang="de-DE"/>
+            <a:r>
+              <a:rPr lang="de-DE"/>
+              <a:t>29.06.2023</a:t>
+            </a:r>
           </a:p>
         </p:txBody>
       </p:sp>
@@ -11553,11 +11678,10 @@
           <a:bodyPr/>
           <a:lstStyle/>
           <a:p>
-            <a:fld id="{25118A72-986D-48C9-AAC8-AE8DB10EA9EB}" type="datetime1">
-              <a:rPr lang="de-DE" smtClean="0"/>
-              <a:t>26.06.2023</a:t>
-            </a:fld>
-            <a:endParaRPr lang="de-DE"/>
+            <a:r>
+              <a:rPr lang="de-DE"/>
+              <a:t>29.06.2023</a:t>
+            </a:r>
           </a:p>
         </p:txBody>
       </p:sp>

</xml_diff>